<commit_message>
Corretti diagrammi uml, documentazione tecnica e presentazione
</commit_message>
<xml_diff>
--- a/Documentazione/Presentazione.pptx
+++ b/Documentazione/Presentazione.pptx
@@ -210,7 +210,7 @@
           <a:p>
             <a:fld id="{BE0F7DE1-FC91-4113-A85F-1F7208607959}" type="datetimeFigureOut">
               <a:rPr lang="it-IT" smtClean="0"/>
-              <a:t>26/01/2024</a:t>
+              <a:t>30/01/2024</a:t>
             </a:fld>
             <a:endParaRPr lang="it-IT"/>
           </a:p>
@@ -1234,7 +1234,7 @@
           <a:p>
             <a:fld id="{37535506-E4D8-4B37-B844-6EB28F68A436}" type="datetimeFigureOut">
               <a:rPr lang="en-GB" smtClean="0"/>
-              <a:t>26/01/2024</a:t>
+              <a:t>30/01/2024</a:t>
             </a:fld>
             <a:endParaRPr lang="en-GB"/>
           </a:p>
@@ -1564,7 +1564,7 @@
           <a:p>
             <a:fld id="{37535506-E4D8-4B37-B844-6EB28F68A436}" type="datetimeFigureOut">
               <a:rPr lang="en-GB" smtClean="0"/>
-              <a:t>26/01/2024</a:t>
+              <a:t>30/01/2024</a:t>
             </a:fld>
             <a:endParaRPr lang="en-GB"/>
           </a:p>
@@ -1744,7 +1744,7 @@
           <a:p>
             <a:fld id="{37535506-E4D8-4B37-B844-6EB28F68A436}" type="datetimeFigureOut">
               <a:rPr lang="en-GB" smtClean="0"/>
-              <a:t>26/01/2024</a:t>
+              <a:t>30/01/2024</a:t>
             </a:fld>
             <a:endParaRPr lang="en-GB"/>
           </a:p>
@@ -1914,7 +1914,7 @@
           <a:p>
             <a:fld id="{37535506-E4D8-4B37-B844-6EB28F68A436}" type="datetimeFigureOut">
               <a:rPr lang="en-GB" smtClean="0"/>
-              <a:t>26/01/2024</a:t>
+              <a:t>30/01/2024</a:t>
             </a:fld>
             <a:endParaRPr lang="en-GB"/>
           </a:p>
@@ -2191,7 +2191,7 @@
           <a:p>
             <a:fld id="{37535506-E4D8-4B37-B844-6EB28F68A436}" type="datetimeFigureOut">
               <a:rPr lang="en-GB" smtClean="0"/>
-              <a:t>26/01/2024</a:t>
+              <a:t>30/01/2024</a:t>
             </a:fld>
             <a:endParaRPr lang="en-GB"/>
           </a:p>
@@ -2585,7 +2585,7 @@
           <a:p>
             <a:fld id="{37535506-E4D8-4B37-B844-6EB28F68A436}" type="datetimeFigureOut">
               <a:rPr lang="en-GB" smtClean="0"/>
-              <a:t>26/01/2024</a:t>
+              <a:t>30/01/2024</a:t>
             </a:fld>
             <a:endParaRPr lang="en-GB"/>
           </a:p>
@@ -3062,7 +3062,7 @@
           <a:p>
             <a:fld id="{37535506-E4D8-4B37-B844-6EB28F68A436}" type="datetimeFigureOut">
               <a:rPr lang="en-GB" smtClean="0"/>
-              <a:t>26/01/2024</a:t>
+              <a:t>30/01/2024</a:t>
             </a:fld>
             <a:endParaRPr lang="en-GB"/>
           </a:p>
@@ -3180,7 +3180,7 @@
           <a:p>
             <a:fld id="{37535506-E4D8-4B37-B844-6EB28F68A436}" type="datetimeFigureOut">
               <a:rPr lang="en-GB" smtClean="0"/>
-              <a:t>26/01/2024</a:t>
+              <a:t>30/01/2024</a:t>
             </a:fld>
             <a:endParaRPr lang="en-GB"/>
           </a:p>
@@ -3275,7 +3275,7 @@
           <a:p>
             <a:fld id="{37535506-E4D8-4B37-B844-6EB28F68A436}" type="datetimeFigureOut">
               <a:rPr lang="en-GB" smtClean="0"/>
-              <a:t>26/01/2024</a:t>
+              <a:t>30/01/2024</a:t>
             </a:fld>
             <a:endParaRPr lang="en-GB"/>
           </a:p>
@@ -3621,7 +3621,7 @@
           <a:p>
             <a:fld id="{37535506-E4D8-4B37-B844-6EB28F68A436}" type="datetimeFigureOut">
               <a:rPr lang="en-GB" smtClean="0"/>
-              <a:t>26/01/2024</a:t>
+              <a:t>30/01/2024</a:t>
             </a:fld>
             <a:endParaRPr lang="en-GB"/>
           </a:p>
@@ -4009,7 +4009,7 @@
           <a:p>
             <a:fld id="{37535506-E4D8-4B37-B844-6EB28F68A436}" type="datetimeFigureOut">
               <a:rPr lang="en-GB" smtClean="0"/>
-              <a:t>26/01/2024</a:t>
+              <a:t>30/01/2024</a:t>
             </a:fld>
             <a:endParaRPr lang="en-GB"/>
           </a:p>
@@ -4287,7 +4287,7 @@
           <a:p>
             <a:fld id="{37535506-E4D8-4B37-B844-6EB28F68A436}" type="datetimeFigureOut">
               <a:rPr lang="en-GB" smtClean="0"/>
-              <a:t>26/01/2024</a:t>
+              <a:t>30/01/2024</a:t>
             </a:fld>
             <a:endParaRPr lang="en-GB"/>
           </a:p>
@@ -8063,10 +8063,10 @@
         </p:nvGrpSpPr>
         <p:grpSpPr>
           <a:xfrm>
-            <a:off x="6345750" y="5636016"/>
-            <a:ext cx="1863101" cy="765456"/>
-            <a:chOff x="3232076" y="5636016"/>
-            <a:chExt cx="1863101" cy="765456"/>
+            <a:off x="5705062" y="5154593"/>
+            <a:ext cx="2545397" cy="1246879"/>
+            <a:chOff x="2591388" y="5154593"/>
+            <a:chExt cx="2545397" cy="1246879"/>
           </a:xfrm>
         </p:grpSpPr>
         <p:cxnSp>
@@ -8127,8 +8127,8 @@
           </p:nvSpPr>
           <p:spPr>
             <a:xfrm>
-              <a:off x="3232076" y="5636016"/>
-              <a:ext cx="1863101" cy="523220"/>
+              <a:off x="2591388" y="5154593"/>
+              <a:ext cx="2545397" cy="954107"/>
             </a:xfrm>
             <a:prstGeom prst="rect">
               <a:avLst/>
@@ -8144,10 +8144,24 @@
             </a:bodyPr>
             <a:lstStyle/>
             <a:p>
+              <a:pPr algn="just"/>
               <a:r>
                 <a:rPr lang="it-IT" sz="1400" dirty="0"/>
-                <a:t>Abilita/disabilita modifica box http</a:t>
+                <a:t>Seleziona l’elemento usato come input tra il file indicato nel </a:t>
               </a:r>
+              <a:r>
+                <a:rPr lang="it-IT" sz="1400" dirty="0" err="1"/>
+                <a:t>path</a:t>
+              </a:r>
+              <a:r>
+                <a:rPr lang="it-IT" sz="1400" dirty="0"/>
+                <a:t> e la stringa nel box HTTP </a:t>
+              </a:r>
+              <a:r>
+                <a:rPr lang="it-IT" sz="1400" dirty="0" err="1"/>
+                <a:t>request</a:t>
+              </a:r>
+              <a:endParaRPr lang="it-IT" sz="1400" dirty="0"/>
             </a:p>
           </p:txBody>
         </p:sp>

</xml_diff>